<commit_message>
Update 1.pptx 1 ~ 10
</commit_message>
<xml_diff>
--- a/BasicForm.pptx
+++ b/BasicForm.pptx
@@ -261,7 +261,7 @@
           <a:p>
             <a:fld id="{76969C88-B244-455D-A017-012B25B1ACDD}" type="datetimeFigureOut">
               <a:rPr lang="en-US" smtClean="0"/>
-              <a:t>1/24/2024</a:t>
+              <a:t>1/28/2024</a:t>
             </a:fld>
             <a:endParaRPr lang="en-US"/>
           </a:p>
@@ -475,7 +475,7 @@
           <a:p>
             <a:fld id="{76969C88-B244-455D-A017-012B25B1ACDD}" type="datetimeFigureOut">
               <a:rPr lang="en-US" smtClean="0"/>
-              <a:t>1/24/2024</a:t>
+              <a:t>1/28/2024</a:t>
             </a:fld>
             <a:endParaRPr lang="en-US"/>
           </a:p>
@@ -699,7 +699,7 @@
           <a:p>
             <a:fld id="{76969C88-B244-455D-A017-012B25B1ACDD}" type="datetimeFigureOut">
               <a:rPr lang="en-US" smtClean="0"/>
-              <a:t>1/24/2024</a:t>
+              <a:t>1/28/2024</a:t>
             </a:fld>
             <a:endParaRPr lang="en-US"/>
           </a:p>
@@ -939,7 +939,7 @@
           <a:p>
             <a:fld id="{76969C88-B244-455D-A017-012B25B1ACDD}" type="datetimeFigureOut">
               <a:rPr lang="en-US" smtClean="0"/>
-              <a:t>1/24/2024</a:t>
+              <a:t>1/28/2024</a:t>
             </a:fld>
             <a:endParaRPr lang="en-US" dirty="0"/>
           </a:p>
@@ -1160,7 +1160,7 @@
           <a:p>
             <a:fld id="{76969C88-B244-455D-A017-012B25B1ACDD}" type="datetimeFigureOut">
               <a:rPr lang="en-US" smtClean="0"/>
-              <a:t>1/24/2024</a:t>
+              <a:t>1/28/2024</a:t>
             </a:fld>
             <a:endParaRPr lang="en-US"/>
           </a:p>
@@ -1450,7 +1450,7 @@
           <a:p>
             <a:fld id="{76969C88-B244-455D-A017-012B25B1ACDD}" type="datetimeFigureOut">
               <a:rPr lang="en-US" smtClean="0"/>
-              <a:t>1/24/2024</a:t>
+              <a:t>1/28/2024</a:t>
             </a:fld>
             <a:endParaRPr lang="en-US"/>
           </a:p>
@@ -1808,7 +1808,7 @@
           <a:p>
             <a:fld id="{76969C88-B244-455D-A017-012B25B1ACDD}" type="datetimeFigureOut">
               <a:rPr lang="en-US" smtClean="0"/>
-              <a:t>1/24/2024</a:t>
+              <a:t>1/28/2024</a:t>
             </a:fld>
             <a:endParaRPr lang="en-US"/>
           </a:p>
@@ -1974,7 +1974,7 @@
           <a:p>
             <a:fld id="{76969C88-B244-455D-A017-012B25B1ACDD}" type="datetimeFigureOut">
               <a:rPr lang="en-US" smtClean="0"/>
-              <a:t>1/24/2024</a:t>
+              <a:t>1/28/2024</a:t>
             </a:fld>
             <a:endParaRPr lang="en-US"/>
           </a:p>
@@ -2033,7 +2033,7 @@
           <a:p>
             <a:fld id="{76969C88-B244-455D-A017-012B25B1ACDD}" type="datetimeFigureOut">
               <a:rPr lang="en-US" smtClean="0"/>
-              <a:t>1/24/2024</a:t>
+              <a:t>1/28/2024</a:t>
             </a:fld>
             <a:endParaRPr lang="en-US"/>
           </a:p>
@@ -2361,7 +2361,7 @@
           <a:p>
             <a:fld id="{76969C88-B244-455D-A017-012B25B1ACDD}" type="datetimeFigureOut">
               <a:rPr lang="en-US" smtClean="0"/>
-              <a:t>1/24/2024</a:t>
+              <a:t>1/28/2024</a:t>
             </a:fld>
             <a:endParaRPr lang="en-US"/>
           </a:p>
@@ -2668,7 +2668,7 @@
           <a:p>
             <a:fld id="{76969C88-B244-455D-A017-012B25B1ACDD}" type="datetimeFigureOut">
               <a:rPr lang="en-US" smtClean="0"/>
-              <a:t>1/24/2024</a:t>
+              <a:t>1/28/2024</a:t>
             </a:fld>
             <a:endParaRPr lang="en-US"/>
           </a:p>
@@ -3434,7 +3434,7 @@
             <a:fld id="{76969C88-B244-455D-A017-012B25B1ACDD}" type="datetimeFigureOut">
               <a:rPr lang="en-US" smtClean="0"/>
               <a:pPr/>
-              <a:t>1/24/2024</a:t>
+              <a:t>1/28/2024</a:t>
             </a:fld>
             <a:endParaRPr lang="en-US"/>
           </a:p>
@@ -3491,7 +3491,7 @@
         </a:spcBef>
         <a:buFont typeface="Arial" panose="020B0604020202020204" pitchFamily="34" charset="0"/>
         <a:buChar char="•"/>
-        <a:defRPr sz="2000" kern="1200" spc="10">
+        <a:defRPr sz="1600" kern="1200" spc="10">
           <a:solidFill>
             <a:schemeClr val="tx1">
               <a:alpha val="70000"/>
@@ -3511,7 +3511,7 @@
         </a:spcBef>
         <a:buFont typeface="Arial" panose="020B0604020202020204" pitchFamily="34" charset="0"/>
         <a:buChar char="•"/>
-        <a:defRPr sz="1600" kern="1200" spc="10">
+        <a:defRPr sz="1200" kern="1200" spc="10">
           <a:solidFill>
             <a:schemeClr val="tx1">
               <a:alpha val="70000"/>
@@ -3531,7 +3531,7 @@
         </a:spcBef>
         <a:buFont typeface="Arial" panose="020B0604020202020204" pitchFamily="34" charset="0"/>
         <a:buChar char="•"/>
-        <a:defRPr sz="1600" kern="1200" spc="10">
+        <a:defRPr sz="1200" kern="1200" spc="10">
           <a:solidFill>
             <a:schemeClr val="tx1">
               <a:alpha val="70000"/>
@@ -3551,7 +3551,7 @@
         </a:spcBef>
         <a:buFont typeface="Arial" panose="020B0604020202020204" pitchFamily="34" charset="0"/>
         <a:buChar char="•"/>
-        <a:defRPr sz="1600" kern="1200" spc="10">
+        <a:defRPr sz="1200" kern="1200" spc="10">
           <a:solidFill>
             <a:schemeClr val="tx1">
               <a:alpha val="70000"/>
@@ -3571,7 +3571,7 @@
         </a:spcBef>
         <a:buFont typeface="Arial" panose="020B0604020202020204" pitchFamily="34" charset="0"/>
         <a:buChar char="•"/>
-        <a:defRPr sz="1600" kern="1200" spc="10">
+        <a:defRPr sz="1200" kern="1200" spc="10">
           <a:solidFill>
             <a:schemeClr val="tx1">
               <a:alpha val="70000"/>

</xml_diff>